<commit_message>
update s11 to s32 1
</commit_message>
<xml_diff>
--- a/images/schedule/schedule.pptx
+++ b/images/schedule/schedule.pptx
@@ -3497,7 +3497,7 @@
           <p:nvPr>
             <p:extLst>
               <p:ext uri="{D42A27DB-BD31-4B8C-83A1-F6EECF244321}">
-                <p14:modId xmlns:p14="http://schemas.microsoft.com/office/powerpoint/2010/main" val="4011563325"/>
+                <p14:modId xmlns:p14="http://schemas.microsoft.com/office/powerpoint/2010/main" val="2950897251"/>
               </p:ext>
             </p:extLst>
           </p:nvPr>
@@ -6370,7 +6370,7 @@
                           <a:ea typeface="+mn-ea"/>
                           <a:cs typeface="+mn-cs"/>
                         </a:rPr>
-                        <a:t>Oceanic Environmental Perception and Operation Robot</a:t>
+                        <a:t>Innovative Design and Performance Evaluation of Robot Mechanisms Ⅰ</a:t>
                       </a:r>
                       <a:endParaRPr lang="zh-CN" altLang="en-US" sz="1400" b="1" kern="1200" dirty="0">
                         <a:solidFill>
@@ -7177,7 +7177,7 @@
           <p:nvPr>
             <p:extLst>
               <p:ext uri="{D42A27DB-BD31-4B8C-83A1-F6EECF244321}">
-                <p14:modId xmlns:p14="http://schemas.microsoft.com/office/powerpoint/2010/main" val="2530846515"/>
+                <p14:modId xmlns:p14="http://schemas.microsoft.com/office/powerpoint/2010/main" val="935365487"/>
               </p:ext>
             </p:extLst>
           </p:nvPr>
@@ -10681,7 +10681,7 @@
                           <a:ea typeface="+mn-ea"/>
                           <a:cs typeface="+mn-cs"/>
                         </a:rPr>
-                        <a:t>Innovative Design and Performance Evaluation of Robot Mechanisms</a:t>
+                        <a:t>Innovative Design and Performance Evaluation of Robot Mechanisms Ⅱ</a:t>
                       </a:r>
                     </a:p>
                   </a:txBody>

</xml_diff>